<commit_message>
Update esp32 code explanation.pptx
</commit_message>
<xml_diff>
--- a/esp32/esp32 code explanation.pptx
+++ b/esp32/esp32 code explanation.pptx
@@ -3,14 +3,16 @@
 <p:presentation xmlns:a="http://schemas.openxmlformats.org/drawingml/2006/main" xmlns:p="http://schemas.openxmlformats.org/presentationml/2006/main" xmlns:r="http://schemas.openxmlformats.org/officeDocument/2006/relationships" xmlns:p14="http://schemas.microsoft.com/office/powerpoint/2010/main" xmlns:p15="http://schemas.microsoft.com/office/powerpoint/2012/main" xmlns:mc="http://schemas.openxmlformats.org/markup-compatibility/2006">
   <p:sldMasterIdLst>
     <p:sldMasterId id="2147483648" r:id="rId2"/>
+    <p:sldMasterId id="2147483650" r:id="rId3"/>
   </p:sldMasterIdLst>
   <p:sldIdLst>
-    <p:sldId id="256" r:id="rId3"/>
-    <p:sldId id="257" r:id="rId4"/>
-    <p:sldId id="258" r:id="rId5"/>
-    <p:sldId id="259" r:id="rId6"/>
-    <p:sldId id="260" r:id="rId7"/>
-    <p:sldId id="261" r:id="rId8"/>
+    <p:sldId id="256" r:id="rId4"/>
+    <p:sldId id="257" r:id="rId5"/>
+    <p:sldId id="258" r:id="rId6"/>
+    <p:sldId id="259" r:id="rId7"/>
+    <p:sldId id="260" r:id="rId8"/>
+    <p:sldId id="261" r:id="rId9"/>
+    <p:sldId id="262" r:id="rId10"/>
   </p:sldIdLst>
   <p:sldSz cx="10080625" cy="5670550"/>
   <p:notesSz cx="7772400" cy="10058400"/>
@@ -47,7 +49,7 @@
         <p:spPr>
           <a:xfrm>
             <a:off x="504000" y="226080"/>
-            <a:ext cx="9071640" cy="946440"/>
+            <a:ext cx="9071280" cy="946080"/>
           </a:xfrm>
           <a:prstGeom prst="rect">
             <a:avLst/>
@@ -88,7 +90,7 @@
         <p:spPr>
           <a:xfrm>
             <a:off x="504000" y="1326600"/>
-            <a:ext cx="9071640" cy="3288240"/>
+            <a:ext cx="9071280" cy="3287880"/>
           </a:xfrm>
           <a:prstGeom prst="rect">
             <a:avLst/>
@@ -123,7 +125,7 @@
             <a:spLocks noGrp="1"/>
           </p:cNvSpPr>
           <p:nvPr>
-            <p:ph type="ftr" idx="2"/>
+            <p:ph type="ftr" idx="1"/>
           </p:nvPr>
         </p:nvSpPr>
         <p:spPr/>
@@ -143,14 +145,14 @@
             <a:spLocks noGrp="1"/>
           </p:cNvSpPr>
           <p:nvPr>
-            <p:ph type="sldNum" idx="3"/>
+            <p:ph type="sldNum" idx="2"/>
           </p:nvPr>
         </p:nvSpPr>
         <p:spPr/>
         <p:txBody>
           <a:bodyPr/>
           <a:p>
-            <a:fld id="{F432ED37-5F09-4503-82E1-DC7E566DB06D}" type="slidenum">
+            <a:fld id="{183CC0AE-F883-4AD4-B375-244D46CB66E2}" type="slidenum">
               <a:t>&lt;#&gt;</a:t>
             </a:fld>
           </a:p>
@@ -163,7 +165,7 @@
             <a:spLocks noGrp="1"/>
           </p:cNvSpPr>
           <p:nvPr>
-            <p:ph type="dt" idx="1"/>
+            <p:ph type="dt" idx="3"/>
           </p:nvPr>
         </p:nvSpPr>
         <p:spPr/>
@@ -184,7 +186,7 @@
 
 <file path=ppt/slideLayouts/slideLayout2.xml><?xml version="1.0" encoding="utf-8"?>
 <p:sldLayout xmlns:a="http://schemas.openxmlformats.org/drawingml/2006/main" xmlns:p="http://schemas.openxmlformats.org/presentationml/2006/main" xmlns:r="http://schemas.openxmlformats.org/officeDocument/2006/relationships" xmlns:p14="http://schemas.microsoft.com/office/powerpoint/2010/main" xmlns:p15="http://schemas.microsoft.com/office/powerpoint/2012/main" xmlns:mc="http://schemas.openxmlformats.org/markup-compatibility/2006" type="tx" preserve="1">
-  <p:cSld name="Default">
+  <p:cSld name="Default 1">
     <p:spTree>
       <p:nvGrpSpPr>
         <p:cNvPr id="1" name=""/>
@@ -201,7 +203,7 @@
       </p:grpSpPr>
       <p:sp>
         <p:nvSpPr>
-          <p:cNvPr id="7" name="PlaceHolder 1"/>
+          <p:cNvPr id="12" name="PlaceHolder 1"/>
           <p:cNvSpPr>
             <a:spLocks noGrp="1"/>
           </p:cNvSpPr>
@@ -212,7 +214,7 @@
         <p:spPr>
           <a:xfrm>
             <a:off x="504000" y="226080"/>
-            <a:ext cx="9071640" cy="946440"/>
+            <a:ext cx="9071280" cy="946080"/>
           </a:xfrm>
           <a:prstGeom prst="rect">
             <a:avLst/>
@@ -242,7 +244,7 @@
       </p:sp>
       <p:sp>
         <p:nvSpPr>
-          <p:cNvPr id="8" name="PlaceHolder 2"/>
+          <p:cNvPr id="13" name="PlaceHolder 2"/>
           <p:cNvSpPr>
             <a:spLocks noGrp="1"/>
           </p:cNvSpPr>
@@ -253,7 +255,7 @@
         <p:spPr>
           <a:xfrm>
             <a:off x="504000" y="1326600"/>
-            <a:ext cx="9071640" cy="3288240"/>
+            <a:ext cx="9071280" cy="3287880"/>
           </a:xfrm>
           <a:prstGeom prst="rect">
             <a:avLst/>
@@ -291,7 +293,7 @@
             <a:spLocks noGrp="1"/>
           </p:cNvSpPr>
           <p:nvPr>
-            <p:ph type="ftr" idx="2"/>
+            <p:ph type="ftr" idx="4"/>
           </p:nvPr>
         </p:nvSpPr>
         <p:spPr/>
@@ -311,14 +313,14 @@
             <a:spLocks noGrp="1"/>
           </p:cNvSpPr>
           <p:nvPr>
-            <p:ph type="sldNum" idx="3"/>
+            <p:ph type="sldNum" idx="5"/>
           </p:nvPr>
         </p:nvSpPr>
         <p:spPr/>
         <p:txBody>
           <a:bodyPr/>
           <a:p>
-            <a:fld id="{BBDA99F6-8289-4EEE-A72F-1BB0B7C4EB92}" type="slidenum">
+            <a:fld id="{CC30DE8A-9347-46EC-95D3-20007FE8A465}" type="slidenum">
               <a:t>&lt;#&gt;</a:t>
             </a:fld>
           </a:p>
@@ -331,7 +333,172 @@
             <a:spLocks noGrp="1"/>
           </p:cNvSpPr>
           <p:nvPr>
-            <p:ph type="dt" idx="1"/>
+            <p:ph type="dt" idx="6"/>
+          </p:nvPr>
+        </p:nvSpPr>
+        <p:spPr/>
+        <p:txBody>
+          <a:bodyPr/>
+          <a:p>
+            <a:r>
+              <a:rPr lang="en-US"/>
+              <a:t/>
+            </a:r>
+          </a:p>
+        </p:txBody>
+      </p:sp>
+    </p:spTree>
+  </p:cSld>
+</p:sldLayout>
+</file>
+
+<file path=ppt/slideLayouts/slideLayout3.xml><?xml version="1.0" encoding="utf-8"?>
+<p:sldLayout xmlns:a="http://schemas.openxmlformats.org/drawingml/2006/main" xmlns:p="http://schemas.openxmlformats.org/presentationml/2006/main" xmlns:r="http://schemas.openxmlformats.org/officeDocument/2006/relationships" xmlns:p14="http://schemas.microsoft.com/office/powerpoint/2010/main" xmlns:p15="http://schemas.microsoft.com/office/powerpoint/2012/main" xmlns:mc="http://schemas.openxmlformats.org/markup-compatibility/2006" type="title" preserve="1">
+  <p:cSld name="Default 1">
+    <p:spTree>
+      <p:nvGrpSpPr>
+        <p:cNvPr id="1" name=""/>
+        <p:cNvGrpSpPr/>
+        <p:nvPr/>
+      </p:nvGrpSpPr>
+      <p:grpSpPr>
+        <a:xfrm>
+          <a:off x="0" y="0"/>
+          <a:ext cx="0" cy="0"/>
+          <a:chOff x="0" y="0"/>
+          <a:chExt cx="0" cy="0"/>
+        </a:xfrm>
+      </p:grpSpPr>
+      <p:sp>
+        <p:nvSpPr>
+          <p:cNvPr id="14" name="PlaceHolder 1"/>
+          <p:cNvSpPr>
+            <a:spLocks noGrp="1"/>
+          </p:cNvSpPr>
+          <p:nvPr>
+            <p:ph type="title"/>
+          </p:nvPr>
+        </p:nvSpPr>
+        <p:spPr>
+          <a:xfrm>
+            <a:off x="504000" y="226080"/>
+            <a:ext cx="9071280" cy="946080"/>
+          </a:xfrm>
+          <a:prstGeom prst="rect">
+            <a:avLst/>
+          </a:prstGeom>
+          <a:noFill/>
+          <a:ln w="0">
+            <a:noFill/>
+          </a:ln>
+        </p:spPr>
+        <p:txBody>
+          <a:bodyPr lIns="0" rIns="0" tIns="0" bIns="0" anchor="ctr">
+            <a:noAutofit/>
+          </a:bodyPr>
+          <a:p>
+            <a:pPr indent="0" algn="ctr">
+              <a:buNone/>
+            </a:pPr>
+            <a:endParaRPr b="0" lang="en-US" sz="4400" strike="noStrike" u="none">
+              <a:solidFill>
+                <a:srgbClr val="000000"/>
+              </a:solidFill>
+              <a:uFillTx/>
+              <a:latin typeface="Arial"/>
+            </a:endParaRPr>
+          </a:p>
+        </p:txBody>
+      </p:sp>
+      <p:sp>
+        <p:nvSpPr>
+          <p:cNvPr id="15" name="PlaceHolder 2"/>
+          <p:cNvSpPr>
+            <a:spLocks noGrp="1"/>
+          </p:cNvSpPr>
+          <p:nvPr>
+            <p:ph type="subTitle"/>
+          </p:nvPr>
+        </p:nvSpPr>
+        <p:spPr>
+          <a:xfrm>
+            <a:off x="504000" y="1326600"/>
+            <a:ext cx="9071280" cy="3287880"/>
+          </a:xfrm>
+          <a:prstGeom prst="rect">
+            <a:avLst/>
+          </a:prstGeom>
+          <a:noFill/>
+          <a:ln w="0">
+            <a:noFill/>
+          </a:ln>
+        </p:spPr>
+        <p:txBody>
+          <a:bodyPr lIns="0" rIns="0" tIns="0" bIns="0" anchor="ctr">
+            <a:noAutofit/>
+          </a:bodyPr>
+          <a:p>
+            <a:pPr indent="0" algn="ctr">
+              <a:buNone/>
+            </a:pPr>
+            <a:endParaRPr b="0" lang="en-US" sz="3200" strike="noStrike" u="none">
+              <a:solidFill>
+                <a:srgbClr val="000000"/>
+              </a:solidFill>
+              <a:uFillTx/>
+              <a:latin typeface="Arial"/>
+            </a:endParaRPr>
+          </a:p>
+        </p:txBody>
+      </p:sp>
+      <p:sp>
+        <p:nvSpPr>
+          <p:cNvPr id="4" name="PlaceHolder 3"/>
+          <p:cNvSpPr>
+            <a:spLocks noGrp="1"/>
+          </p:cNvSpPr>
+          <p:nvPr>
+            <p:ph type="ftr" idx="4"/>
+          </p:nvPr>
+        </p:nvSpPr>
+        <p:spPr/>
+        <p:txBody>
+          <a:bodyPr/>
+          <a:p>
+            <a:r>
+              <a:t>Footer</a:t>
+            </a:r>
+          </a:p>
+        </p:txBody>
+      </p:sp>
+      <p:sp>
+        <p:nvSpPr>
+          <p:cNvPr id="5" name="PlaceHolder 4"/>
+          <p:cNvSpPr>
+            <a:spLocks noGrp="1"/>
+          </p:cNvSpPr>
+          <p:nvPr>
+            <p:ph type="sldNum" idx="5"/>
+          </p:nvPr>
+        </p:nvSpPr>
+        <p:spPr/>
+        <p:txBody>
+          <a:bodyPr/>
+          <a:p>
+            <a:fld id="{A760EB1D-4B83-49C3-A9FA-42EE46505046}" type="slidenum">
+              <a:t>&lt;#&gt;</a:t>
+            </a:fld>
+          </a:p>
+        </p:txBody>
+      </p:sp>
+      <p:sp>
+        <p:nvSpPr>
+          <p:cNvPr id="6" name="PlaceHolder 5"/>
+          <p:cNvSpPr>
+            <a:spLocks noGrp="1"/>
+          </p:cNvSpPr>
+          <p:nvPr>
+            <p:ph type="dt" idx="6"/>
           </p:nvPr>
         </p:nvSpPr>
         <p:spPr/>
@@ -380,7 +547,7 @@
         <p:spPr>
           <a:xfrm>
             <a:off x="504000" y="226080"/>
-            <a:ext cx="9071640" cy="946440"/>
+            <a:ext cx="9071280" cy="946080"/>
           </a:xfrm>
           <a:prstGeom prst="rect">
             <a:avLst/>
@@ -395,11 +562,11 @@
             <a:noAutofit/>
           </a:bodyPr>
           <a:p>
-            <a:pPr indent="0" algn="ctr">
+            <a:pPr indent="0">
               <a:buNone/>
             </a:pPr>
             <a:r>
-              <a:rPr b="0" lang="en-US" sz="4400" strike="noStrike" u="none">
+              <a:rPr b="0" lang="en-US" sz="1800" strike="noStrike" u="none">
                 <a:solidFill>
                   <a:srgbClr val="000000"/>
                 </a:solidFill>
@@ -408,7 +575,7 @@
               </a:rPr>
               <a:t>Click to edit the title text format</a:t>
             </a:r>
-            <a:endParaRPr b="0" lang="en-US" sz="4400" strike="noStrike" u="none">
+            <a:endParaRPr b="0" lang="en-US" sz="1800" strike="noStrike" u="none">
               <a:solidFill>
                 <a:srgbClr val="000000"/>
               </a:solidFill>
@@ -425,13 +592,226 @@
             <a:spLocks noGrp="1"/>
           </p:cNvSpPr>
           <p:nvPr>
+            <p:ph type="ftr" idx="1"/>
+          </p:nvPr>
+        </p:nvSpPr>
+        <p:spPr>
+          <a:xfrm>
+            <a:off x="3447360" y="5165280"/>
+            <a:ext cx="3194640" cy="390240"/>
+          </a:xfrm>
+          <a:prstGeom prst="rect">
+            <a:avLst/>
+          </a:prstGeom>
+          <a:noFill/>
+          <a:ln w="0">
+            <a:noFill/>
+          </a:ln>
+        </p:spPr>
+        <p:txBody>
+          <a:bodyPr lIns="0" rIns="0" tIns="0" bIns="0" anchor="t">
+            <a:noAutofit/>
+          </a:bodyPr>
+          <a:lstStyle>
+            <a:lvl1pPr indent="0" algn="ctr">
+              <a:lnSpc>
+                <a:spcPct val="100000"/>
+              </a:lnSpc>
+              <a:buNone/>
+              <a:tabLst>
+                <a:tab algn="l" pos="0"/>
+              </a:tabLst>
+              <a:defRPr b="0" lang="en-US" sz="1400" strike="noStrike" u="none">
+                <a:solidFill>
+                  <a:srgbClr val="000000"/>
+                </a:solidFill>
+                <a:uFillTx/>
+                <a:latin typeface="Times New Roman"/>
+              </a:defRPr>
+            </a:lvl1pPr>
+          </a:lstStyle>
+          <a:p>
+            <a:pPr indent="0" algn="ctr">
+              <a:lnSpc>
+                <a:spcPct val="100000"/>
+              </a:lnSpc>
+              <a:buNone/>
+              <a:tabLst>
+                <a:tab algn="l" pos="0"/>
+              </a:tabLst>
+            </a:pPr>
+            <a:r>
+              <a:rPr b="0" lang="en-US" sz="1400" strike="noStrike" u="none">
+                <a:solidFill>
+                  <a:srgbClr val="000000"/>
+                </a:solidFill>
+                <a:uFillTx/>
+                <a:latin typeface="Times New Roman"/>
+              </a:rPr>
+              <a:t>&lt;footer&gt;</a:t>
+            </a:r>
+            <a:endParaRPr b="0" lang="en-US" sz="1400" strike="noStrike" u="none">
+              <a:solidFill>
+                <a:srgbClr val="000000"/>
+              </a:solidFill>
+              <a:uFillTx/>
+              <a:latin typeface="Times New Roman"/>
+            </a:endParaRPr>
+          </a:p>
+        </p:txBody>
+      </p:sp>
+      <p:sp>
+        <p:nvSpPr>
+          <p:cNvPr id="2" name="PlaceHolder 3"/>
+          <p:cNvSpPr>
+            <a:spLocks noGrp="1"/>
+          </p:cNvSpPr>
+          <p:nvPr>
+            <p:ph type="sldNum" idx="2"/>
+          </p:nvPr>
+        </p:nvSpPr>
+        <p:spPr>
+          <a:xfrm>
+            <a:off x="7227360" y="5165280"/>
+            <a:ext cx="2347920" cy="390240"/>
+          </a:xfrm>
+          <a:prstGeom prst="rect">
+            <a:avLst/>
+          </a:prstGeom>
+          <a:noFill/>
+          <a:ln w="0">
+            <a:noFill/>
+          </a:ln>
+        </p:spPr>
+        <p:txBody>
+          <a:bodyPr lIns="0" rIns="0" tIns="0" bIns="0" anchor="t">
+            <a:noAutofit/>
+          </a:bodyPr>
+          <a:lstStyle>
+            <a:lvl1pPr indent="0" algn="r">
+              <a:lnSpc>
+                <a:spcPct val="100000"/>
+              </a:lnSpc>
+              <a:buNone/>
+              <a:tabLst>
+                <a:tab algn="l" pos="0"/>
+              </a:tabLst>
+              <a:defRPr b="0" lang="en-US" sz="1400" strike="noStrike" u="none">
+                <a:solidFill>
+                  <a:srgbClr val="000000"/>
+                </a:solidFill>
+                <a:uFillTx/>
+                <a:latin typeface="Times New Roman"/>
+              </a:defRPr>
+            </a:lvl1pPr>
+          </a:lstStyle>
+          <a:p>
+            <a:pPr indent="0" algn="r">
+              <a:lnSpc>
+                <a:spcPct val="100000"/>
+              </a:lnSpc>
+              <a:buNone/>
+              <a:tabLst>
+                <a:tab algn="l" pos="0"/>
+              </a:tabLst>
+            </a:pPr>
+            <a:fld id="{D48EAF6C-2CB4-4650-B8DE-11C2B20E9A49}" type="slidenum">
+              <a:rPr b="0" lang="en-US" sz="1400" strike="noStrike" u="none">
+                <a:solidFill>
+                  <a:srgbClr val="000000"/>
+                </a:solidFill>
+                <a:uFillTx/>
+                <a:latin typeface="Times New Roman"/>
+              </a:rPr>
+              <a:t>&lt;number&gt;</a:t>
+            </a:fld>
+            <a:endParaRPr b="0" lang="en-US" sz="1400" strike="noStrike" u="none">
+              <a:solidFill>
+                <a:srgbClr val="000000"/>
+              </a:solidFill>
+              <a:uFillTx/>
+              <a:latin typeface="Times New Roman"/>
+            </a:endParaRPr>
+          </a:p>
+        </p:txBody>
+      </p:sp>
+      <p:sp>
+        <p:nvSpPr>
+          <p:cNvPr id="3" name="PlaceHolder 4"/>
+          <p:cNvSpPr>
+            <a:spLocks noGrp="1"/>
+          </p:cNvSpPr>
+          <p:nvPr>
+            <p:ph type="dt" idx="3"/>
+          </p:nvPr>
+        </p:nvSpPr>
+        <p:spPr>
+          <a:xfrm>
+            <a:off x="504000" y="5165280"/>
+            <a:ext cx="2347920" cy="390240"/>
+          </a:xfrm>
+          <a:prstGeom prst="rect">
+            <a:avLst/>
+          </a:prstGeom>
+          <a:noFill/>
+          <a:ln w="0">
+            <a:noFill/>
+          </a:ln>
+        </p:spPr>
+        <p:txBody>
+          <a:bodyPr lIns="0" rIns="0" tIns="0" bIns="0" anchor="t">
+            <a:noAutofit/>
+          </a:bodyPr>
+          <a:lstStyle>
+            <a:lvl1pPr indent="0">
+              <a:buNone/>
+              <a:defRPr b="0" lang="en-US" sz="1400" strike="noStrike" u="none">
+                <a:solidFill>
+                  <a:srgbClr val="000000"/>
+                </a:solidFill>
+                <a:uFillTx/>
+                <a:latin typeface="Times New Roman"/>
+              </a:defRPr>
+            </a:lvl1pPr>
+          </a:lstStyle>
+          <a:p>
+            <a:pPr indent="0">
+              <a:buNone/>
+            </a:pPr>
+            <a:r>
+              <a:rPr b="0" lang="en-US" sz="1400" strike="noStrike" u="none">
+                <a:solidFill>
+                  <a:srgbClr val="000000"/>
+                </a:solidFill>
+                <a:uFillTx/>
+                <a:latin typeface="Times New Roman"/>
+              </a:rPr>
+              <a:t>&lt;date/time&gt;</a:t>
+            </a:r>
+            <a:endParaRPr b="0" lang="en-US" sz="1400" strike="noStrike" u="none">
+              <a:solidFill>
+                <a:srgbClr val="000000"/>
+              </a:solidFill>
+              <a:uFillTx/>
+              <a:latin typeface="Times New Roman"/>
+            </a:endParaRPr>
+          </a:p>
+        </p:txBody>
+      </p:sp>
+      <p:sp>
+        <p:nvSpPr>
+          <p:cNvPr id="4" name="PlaceHolder 5"/>
+          <p:cNvSpPr>
+            <a:spLocks noGrp="1"/>
+          </p:cNvSpPr>
+          <p:nvPr>
             <p:ph type="body"/>
           </p:nvPr>
         </p:nvSpPr>
         <p:spPr>
           <a:xfrm>
             <a:off x="504000" y="1326600"/>
-            <a:ext cx="9071640" cy="3288240"/>
+            <a:ext cx="9072000" cy="3288600"/>
           </a:xfrm>
           <a:prstGeom prst="rect">
             <a:avLst/>
@@ -657,20 +1037,486 @@
           </a:p>
         </p:txBody>
       </p:sp>
-      <p:sp>
-        <p:nvSpPr>
-          <p:cNvPr id="2" name="PlaceHolder 3"/>
-          <p:cNvSpPr>
-            <a:spLocks noGrp="1"/>
-          </p:cNvSpPr>
-          <p:nvPr>
-            <p:ph type="dt" idx="1"/>
+    </p:spTree>
+  </p:cSld>
+  <p:clrMap bg1="lt1" tx1="dk1" bg2="lt2" tx2="dk2" accent1="accent1" accent2="accent2" accent3="accent3" accent4="accent4" accent5="accent5" accent6="accent6" hlink="hlink" folHlink="folHlink"/>
+  <p:sldLayoutIdLst>
+    <p:sldLayoutId id="2147483649" r:id="rId2"/>
+  </p:sldLayoutIdLst>
+</p:sldMaster>
+</file>
+
+<file path=ppt/slideMasters/slideMaster2.xml><?xml version="1.0" encoding="utf-8"?>
+<p:sldMaster xmlns:a="http://schemas.openxmlformats.org/drawingml/2006/main" xmlns:p="http://schemas.openxmlformats.org/presentationml/2006/main" xmlns:r="http://schemas.openxmlformats.org/officeDocument/2006/relationships" xmlns:p14="http://schemas.microsoft.com/office/powerpoint/2010/main" xmlns:p15="http://schemas.microsoft.com/office/powerpoint/2012/main" xmlns:mc="http://schemas.openxmlformats.org/markup-compatibility/2006">
+  <p:cSld>
+    <p:spTree>
+      <p:nvGrpSpPr>
+        <p:cNvPr id="1" name=""/>
+        <p:cNvGrpSpPr/>
+        <p:nvPr/>
+      </p:nvGrpSpPr>
+      <p:grpSpPr>
+        <a:xfrm>
+          <a:off x="0" y="0"/>
+          <a:ext cx="0" cy="0"/>
+          <a:chOff x="0" y="0"/>
+          <a:chExt cx="0" cy="0"/>
+        </a:xfrm>
+      </p:grpSpPr>
+      <p:sp>
+        <p:nvSpPr>
+          <p:cNvPr id="7" name="PlaceHolder 1"/>
+          <p:cNvSpPr>
+            <a:spLocks noGrp="1"/>
+          </p:cNvSpPr>
+          <p:nvPr>
+            <p:ph type="title"/>
+          </p:nvPr>
+        </p:nvSpPr>
+        <p:spPr>
+          <a:xfrm>
+            <a:off x="504000" y="226080"/>
+            <a:ext cx="9071280" cy="946080"/>
+          </a:xfrm>
+          <a:prstGeom prst="rect">
+            <a:avLst/>
+          </a:prstGeom>
+          <a:noFill/>
+          <a:ln w="0">
+            <a:noFill/>
+          </a:ln>
+        </p:spPr>
+        <p:txBody>
+          <a:bodyPr lIns="0" rIns="0" tIns="0" bIns="0" anchor="ctr">
+            <a:noAutofit/>
+          </a:bodyPr>
+          <a:p>
+            <a:pPr indent="0">
+              <a:buNone/>
+            </a:pPr>
+            <a:r>
+              <a:rPr b="0" lang="en-US" sz="1800" strike="noStrike" u="none">
+                <a:solidFill>
+                  <a:srgbClr val="000000"/>
+                </a:solidFill>
+                <a:uFillTx/>
+                <a:latin typeface="Arial"/>
+              </a:rPr>
+              <a:t>Click to edit the title text format</a:t>
+            </a:r>
+            <a:endParaRPr b="0" lang="en-US" sz="1800" strike="noStrike" u="none">
+              <a:solidFill>
+                <a:srgbClr val="000000"/>
+              </a:solidFill>
+              <a:uFillTx/>
+              <a:latin typeface="Arial"/>
+            </a:endParaRPr>
+          </a:p>
+        </p:txBody>
+      </p:sp>
+      <p:sp>
+        <p:nvSpPr>
+          <p:cNvPr id="8" name="PlaceHolder 2"/>
+          <p:cNvSpPr>
+            <a:spLocks noGrp="1"/>
+          </p:cNvSpPr>
+          <p:nvPr>
+            <p:ph type="body"/>
+          </p:nvPr>
+        </p:nvSpPr>
+        <p:spPr>
+          <a:xfrm>
+            <a:off x="504000" y="1326600"/>
+            <a:ext cx="9071280" cy="3287880"/>
+          </a:xfrm>
+          <a:prstGeom prst="rect">
+            <a:avLst/>
+          </a:prstGeom>
+          <a:noFill/>
+          <a:ln w="0">
+            <a:noFill/>
+          </a:ln>
+        </p:spPr>
+        <p:txBody>
+          <a:bodyPr lIns="0" rIns="0" tIns="0" bIns="0" anchor="t">
+            <a:normAutofit/>
+          </a:bodyPr>
+          <a:p>
+            <a:pPr marL="432000" indent="-324000">
+              <a:spcBef>
+                <a:spcPts val="1417"/>
+              </a:spcBef>
+              <a:buClr>
+                <a:srgbClr val="000000"/>
+              </a:buClr>
+              <a:buSzPct val="45000"/>
+              <a:buFont typeface="Wingdings" charset="2"/>
+              <a:buChar char=""/>
+            </a:pPr>
+            <a:r>
+              <a:rPr b="0" lang="en-US" sz="1800" strike="noStrike" u="none">
+                <a:solidFill>
+                  <a:srgbClr val="000000"/>
+                </a:solidFill>
+                <a:uFillTx/>
+                <a:latin typeface="Arial"/>
+              </a:rPr>
+              <a:t>Click to edit the outline text format</a:t>
+            </a:r>
+            <a:endParaRPr b="0" lang="en-US" sz="1800" strike="noStrike" u="none">
+              <a:solidFill>
+                <a:srgbClr val="000000"/>
+              </a:solidFill>
+              <a:uFillTx/>
+              <a:latin typeface="Arial"/>
+            </a:endParaRPr>
+          </a:p>
+          <a:p>
+            <a:pPr lvl="1" marL="864000" indent="-324000">
+              <a:spcBef>
+                <a:spcPts val="1134"/>
+              </a:spcBef>
+              <a:buClr>
+                <a:srgbClr val="000000"/>
+              </a:buClr>
+              <a:buSzPct val="75000"/>
+              <a:buFont typeface="Symbol" charset="2"/>
+              <a:buChar char=""/>
+            </a:pPr>
+            <a:r>
+              <a:rPr b="0" lang="en-US" sz="1800" strike="noStrike" u="none">
+                <a:solidFill>
+                  <a:srgbClr val="000000"/>
+                </a:solidFill>
+                <a:uFillTx/>
+                <a:latin typeface="Arial"/>
+              </a:rPr>
+              <a:t>Second Outline Level</a:t>
+            </a:r>
+            <a:endParaRPr b="0" lang="en-US" sz="1800" strike="noStrike" u="none">
+              <a:solidFill>
+                <a:srgbClr val="000000"/>
+              </a:solidFill>
+              <a:uFillTx/>
+              <a:latin typeface="Arial"/>
+            </a:endParaRPr>
+          </a:p>
+          <a:p>
+            <a:pPr lvl="2" marL="1296000" indent="-288000">
+              <a:spcBef>
+                <a:spcPts val="850"/>
+              </a:spcBef>
+              <a:buClr>
+                <a:srgbClr val="000000"/>
+              </a:buClr>
+              <a:buSzPct val="45000"/>
+              <a:buFont typeface="Wingdings" charset="2"/>
+              <a:buChar char=""/>
+            </a:pPr>
+            <a:r>
+              <a:rPr b="0" lang="en-US" sz="1800" strike="noStrike" u="none">
+                <a:solidFill>
+                  <a:srgbClr val="000000"/>
+                </a:solidFill>
+                <a:uFillTx/>
+                <a:latin typeface="Arial"/>
+              </a:rPr>
+              <a:t>Third Outline Level</a:t>
+            </a:r>
+            <a:endParaRPr b="0" lang="en-US" sz="1800" strike="noStrike" u="none">
+              <a:solidFill>
+                <a:srgbClr val="000000"/>
+              </a:solidFill>
+              <a:uFillTx/>
+              <a:latin typeface="Arial"/>
+            </a:endParaRPr>
+          </a:p>
+          <a:p>
+            <a:pPr lvl="3" marL="1728000" indent="-216000">
+              <a:spcBef>
+                <a:spcPts val="567"/>
+              </a:spcBef>
+              <a:buClr>
+                <a:srgbClr val="000000"/>
+              </a:buClr>
+              <a:buSzPct val="75000"/>
+              <a:buFont typeface="Symbol" charset="2"/>
+              <a:buChar char=""/>
+            </a:pPr>
+            <a:r>
+              <a:rPr b="0" lang="en-US" sz="1800" strike="noStrike" u="none">
+                <a:solidFill>
+                  <a:srgbClr val="000000"/>
+                </a:solidFill>
+                <a:uFillTx/>
+                <a:latin typeface="Arial"/>
+              </a:rPr>
+              <a:t>Fourth Outline Level</a:t>
+            </a:r>
+            <a:endParaRPr b="0" lang="en-US" sz="1800" strike="noStrike" u="none">
+              <a:solidFill>
+                <a:srgbClr val="000000"/>
+              </a:solidFill>
+              <a:uFillTx/>
+              <a:latin typeface="Arial"/>
+            </a:endParaRPr>
+          </a:p>
+          <a:p>
+            <a:pPr lvl="4" marL="2160000" indent="-216000">
+              <a:spcBef>
+                <a:spcPts val="283"/>
+              </a:spcBef>
+              <a:buClr>
+                <a:srgbClr val="000000"/>
+              </a:buClr>
+              <a:buSzPct val="45000"/>
+              <a:buFont typeface="Wingdings" charset="2"/>
+              <a:buChar char=""/>
+            </a:pPr>
+            <a:r>
+              <a:rPr b="0" lang="en-US" sz="1800" strike="noStrike" u="none">
+                <a:solidFill>
+                  <a:srgbClr val="000000"/>
+                </a:solidFill>
+                <a:uFillTx/>
+                <a:latin typeface="Arial"/>
+              </a:rPr>
+              <a:t>Fifth Outline Level</a:t>
+            </a:r>
+            <a:endParaRPr b="0" lang="en-US" sz="1800" strike="noStrike" u="none">
+              <a:solidFill>
+                <a:srgbClr val="000000"/>
+              </a:solidFill>
+              <a:uFillTx/>
+              <a:latin typeface="Arial"/>
+            </a:endParaRPr>
+          </a:p>
+          <a:p>
+            <a:pPr lvl="5" marL="2592000" indent="-216000">
+              <a:spcBef>
+                <a:spcPts val="283"/>
+              </a:spcBef>
+              <a:buClr>
+                <a:srgbClr val="000000"/>
+              </a:buClr>
+              <a:buSzPct val="45000"/>
+              <a:buFont typeface="Wingdings" charset="2"/>
+              <a:buChar char=""/>
+            </a:pPr>
+            <a:r>
+              <a:rPr b="0" lang="en-US" sz="1800" strike="noStrike" u="none">
+                <a:solidFill>
+                  <a:srgbClr val="000000"/>
+                </a:solidFill>
+                <a:uFillTx/>
+                <a:latin typeface="Arial"/>
+              </a:rPr>
+              <a:t>Sixth Outline Level</a:t>
+            </a:r>
+            <a:endParaRPr b="0" lang="en-US" sz="1800" strike="noStrike" u="none">
+              <a:solidFill>
+                <a:srgbClr val="000000"/>
+              </a:solidFill>
+              <a:uFillTx/>
+              <a:latin typeface="Arial"/>
+            </a:endParaRPr>
+          </a:p>
+          <a:p>
+            <a:pPr lvl="6" marL="3024000" indent="-216000">
+              <a:spcBef>
+                <a:spcPts val="283"/>
+              </a:spcBef>
+              <a:buClr>
+                <a:srgbClr val="000000"/>
+              </a:buClr>
+              <a:buSzPct val="45000"/>
+              <a:buFont typeface="Wingdings" charset="2"/>
+              <a:buChar char=""/>
+            </a:pPr>
+            <a:r>
+              <a:rPr b="0" lang="en-US" sz="1800" strike="noStrike" u="none">
+                <a:solidFill>
+                  <a:srgbClr val="000000"/>
+                </a:solidFill>
+                <a:uFillTx/>
+                <a:latin typeface="Arial"/>
+              </a:rPr>
+              <a:t>Seventh Outline Level</a:t>
+            </a:r>
+            <a:endParaRPr b="0" lang="en-US" sz="1800" strike="noStrike" u="none">
+              <a:solidFill>
+                <a:srgbClr val="000000"/>
+              </a:solidFill>
+              <a:uFillTx/>
+              <a:latin typeface="Arial"/>
+            </a:endParaRPr>
+          </a:p>
+        </p:txBody>
+      </p:sp>
+      <p:sp>
+        <p:nvSpPr>
+          <p:cNvPr id="9" name="PlaceHolder 3"/>
+          <p:cNvSpPr>
+            <a:spLocks noGrp="1"/>
+          </p:cNvSpPr>
+          <p:nvPr>
+            <p:ph type="ftr" idx="4"/>
+          </p:nvPr>
+        </p:nvSpPr>
+        <p:spPr>
+          <a:xfrm>
+            <a:off x="3447360" y="5165280"/>
+            <a:ext cx="3194640" cy="390240"/>
+          </a:xfrm>
+          <a:prstGeom prst="rect">
+            <a:avLst/>
+          </a:prstGeom>
+          <a:noFill/>
+          <a:ln w="0">
+            <a:noFill/>
+          </a:ln>
+        </p:spPr>
+        <p:txBody>
+          <a:bodyPr lIns="0" rIns="0" tIns="0" bIns="0" anchor="t">
+            <a:noAutofit/>
+          </a:bodyPr>
+          <a:lstStyle>
+            <a:lvl1pPr indent="0" algn="ctr">
+              <a:lnSpc>
+                <a:spcPct val="100000"/>
+              </a:lnSpc>
+              <a:buNone/>
+              <a:tabLst>
+                <a:tab algn="l" pos="0"/>
+              </a:tabLst>
+              <a:defRPr b="0" lang="en-US" sz="1400" strike="noStrike" u="none">
+                <a:solidFill>
+                  <a:srgbClr val="000000"/>
+                </a:solidFill>
+                <a:uFillTx/>
+                <a:latin typeface="Times New Roman"/>
+              </a:defRPr>
+            </a:lvl1pPr>
+          </a:lstStyle>
+          <a:p>
+            <a:pPr indent="0" algn="ctr">
+              <a:lnSpc>
+                <a:spcPct val="100000"/>
+              </a:lnSpc>
+              <a:buNone/>
+              <a:tabLst>
+                <a:tab algn="l" pos="0"/>
+              </a:tabLst>
+            </a:pPr>
+            <a:r>
+              <a:rPr b="0" lang="en-US" sz="1400" strike="noStrike" u="none">
+                <a:solidFill>
+                  <a:srgbClr val="000000"/>
+                </a:solidFill>
+                <a:uFillTx/>
+                <a:latin typeface="Times New Roman"/>
+              </a:rPr>
+              <a:t>&lt;footer&gt;</a:t>
+            </a:r>
+            <a:endParaRPr b="0" lang="en-US" sz="1400" strike="noStrike" u="none">
+              <a:solidFill>
+                <a:srgbClr val="000000"/>
+              </a:solidFill>
+              <a:uFillTx/>
+              <a:latin typeface="Times New Roman"/>
+            </a:endParaRPr>
+          </a:p>
+        </p:txBody>
+      </p:sp>
+      <p:sp>
+        <p:nvSpPr>
+          <p:cNvPr id="10" name="PlaceHolder 4"/>
+          <p:cNvSpPr>
+            <a:spLocks noGrp="1"/>
+          </p:cNvSpPr>
+          <p:nvPr>
+            <p:ph type="sldNum" idx="5"/>
+          </p:nvPr>
+        </p:nvSpPr>
+        <p:spPr>
+          <a:xfrm>
+            <a:off x="7227360" y="5165280"/>
+            <a:ext cx="2347920" cy="390240"/>
+          </a:xfrm>
+          <a:prstGeom prst="rect">
+            <a:avLst/>
+          </a:prstGeom>
+          <a:noFill/>
+          <a:ln w="0">
+            <a:noFill/>
+          </a:ln>
+        </p:spPr>
+        <p:txBody>
+          <a:bodyPr lIns="0" rIns="0" tIns="0" bIns="0" anchor="t">
+            <a:noAutofit/>
+          </a:bodyPr>
+          <a:lstStyle>
+            <a:lvl1pPr indent="0" algn="r">
+              <a:lnSpc>
+                <a:spcPct val="100000"/>
+              </a:lnSpc>
+              <a:buNone/>
+              <a:tabLst>
+                <a:tab algn="l" pos="0"/>
+              </a:tabLst>
+              <a:defRPr b="0" lang="en-US" sz="1400" strike="noStrike" u="none">
+                <a:solidFill>
+                  <a:srgbClr val="000000"/>
+                </a:solidFill>
+                <a:uFillTx/>
+                <a:latin typeface="Times New Roman"/>
+              </a:defRPr>
+            </a:lvl1pPr>
+          </a:lstStyle>
+          <a:p>
+            <a:pPr indent="0" algn="r">
+              <a:lnSpc>
+                <a:spcPct val="100000"/>
+              </a:lnSpc>
+              <a:buNone/>
+              <a:tabLst>
+                <a:tab algn="l" pos="0"/>
+              </a:tabLst>
+            </a:pPr>
+            <a:fld id="{AC4D2CA4-FCC7-468A-92E5-9B0EA7C7B052}" type="slidenum">
+              <a:rPr b="0" lang="en-US" sz="1400" strike="noStrike" u="none">
+                <a:solidFill>
+                  <a:srgbClr val="000000"/>
+                </a:solidFill>
+                <a:uFillTx/>
+                <a:latin typeface="Times New Roman"/>
+              </a:rPr>
+              <a:t>&lt;number&gt;</a:t>
+            </a:fld>
+            <a:endParaRPr b="0" lang="en-US" sz="1400" strike="noStrike" u="none">
+              <a:solidFill>
+                <a:srgbClr val="000000"/>
+              </a:solidFill>
+              <a:uFillTx/>
+              <a:latin typeface="Times New Roman"/>
+            </a:endParaRPr>
+          </a:p>
+        </p:txBody>
+      </p:sp>
+      <p:sp>
+        <p:nvSpPr>
+          <p:cNvPr id="11" name="PlaceHolder 5"/>
+          <p:cNvSpPr>
+            <a:spLocks noGrp="1"/>
+          </p:cNvSpPr>
+          <p:nvPr>
+            <p:ph type="dt" idx="6"/>
           </p:nvPr>
         </p:nvSpPr>
         <p:spPr>
           <a:xfrm>
             <a:off x="504000" y="5165280"/>
-            <a:ext cx="2348280" cy="390600"/>
+            <a:ext cx="2347920" cy="390240"/>
           </a:xfrm>
           <a:prstGeom prst="rect">
             <a:avLst/>
@@ -720,138 +1566,12 @@
           </a:p>
         </p:txBody>
       </p:sp>
-      <p:sp>
-        <p:nvSpPr>
-          <p:cNvPr id="3" name="PlaceHolder 4"/>
-          <p:cNvSpPr>
-            <a:spLocks noGrp="1"/>
-          </p:cNvSpPr>
-          <p:nvPr>
-            <p:ph type="ftr" idx="2"/>
-          </p:nvPr>
-        </p:nvSpPr>
-        <p:spPr>
-          <a:xfrm>
-            <a:off x="3447360" y="5165280"/>
-            <a:ext cx="3195000" cy="390600"/>
-          </a:xfrm>
-          <a:prstGeom prst="rect">
-            <a:avLst/>
-          </a:prstGeom>
-          <a:noFill/>
-          <a:ln w="0">
-            <a:noFill/>
-          </a:ln>
-        </p:spPr>
-        <p:txBody>
-          <a:bodyPr lIns="0" rIns="0" tIns="0" bIns="0" anchor="t">
-            <a:noAutofit/>
-          </a:bodyPr>
-          <a:lstStyle>
-            <a:lvl1pPr indent="0" algn="ctr">
-              <a:buNone/>
-              <a:defRPr b="0" lang="en-US" sz="1400" strike="noStrike" u="none">
-                <a:solidFill>
-                  <a:srgbClr val="000000"/>
-                </a:solidFill>
-                <a:uFillTx/>
-                <a:latin typeface="Times New Roman"/>
-              </a:defRPr>
-            </a:lvl1pPr>
-          </a:lstStyle>
-          <a:p>
-            <a:pPr indent="0" algn="ctr">
-              <a:buNone/>
-            </a:pPr>
-            <a:r>
-              <a:rPr b="0" lang="en-US" sz="1400" strike="noStrike" u="none">
-                <a:solidFill>
-                  <a:srgbClr val="000000"/>
-                </a:solidFill>
-                <a:uFillTx/>
-                <a:latin typeface="Times New Roman"/>
-              </a:rPr>
-              <a:t>&lt;footer&gt;</a:t>
-            </a:r>
-            <a:endParaRPr b="0" lang="en-US" sz="1400" strike="noStrike" u="none">
-              <a:solidFill>
-                <a:srgbClr val="000000"/>
-              </a:solidFill>
-              <a:uFillTx/>
-              <a:latin typeface="Times New Roman"/>
-            </a:endParaRPr>
-          </a:p>
-        </p:txBody>
-      </p:sp>
-      <p:sp>
-        <p:nvSpPr>
-          <p:cNvPr id="4" name="PlaceHolder 5"/>
-          <p:cNvSpPr>
-            <a:spLocks noGrp="1"/>
-          </p:cNvSpPr>
-          <p:nvPr>
-            <p:ph type="sldNum" idx="3"/>
-          </p:nvPr>
-        </p:nvSpPr>
-        <p:spPr>
-          <a:xfrm>
-            <a:off x="7227360" y="5165280"/>
-            <a:ext cx="2348280" cy="390600"/>
-          </a:xfrm>
-          <a:prstGeom prst="rect">
-            <a:avLst/>
-          </a:prstGeom>
-          <a:noFill/>
-          <a:ln w="0">
-            <a:noFill/>
-          </a:ln>
-        </p:spPr>
-        <p:txBody>
-          <a:bodyPr lIns="0" rIns="0" tIns="0" bIns="0" anchor="t">
-            <a:noAutofit/>
-          </a:bodyPr>
-          <a:lstStyle>
-            <a:lvl1pPr indent="0" algn="r">
-              <a:buNone/>
-              <a:defRPr b="0" lang="en-US" sz="1400" strike="noStrike" u="none">
-                <a:solidFill>
-                  <a:srgbClr val="000000"/>
-                </a:solidFill>
-                <a:uFillTx/>
-                <a:latin typeface="Times New Roman"/>
-              </a:defRPr>
-            </a:lvl1pPr>
-          </a:lstStyle>
-          <a:p>
-            <a:pPr indent="0" algn="r">
-              <a:buNone/>
-            </a:pPr>
-            <a:fld id="{9D3605F1-2FE1-402F-BC46-E4EF8AFD1EDA}" type="slidenum">
-              <a:rPr b="0" lang="en-US" sz="1400" strike="noStrike" u="none">
-                <a:solidFill>
-                  <a:srgbClr val="000000"/>
-                </a:solidFill>
-                <a:uFillTx/>
-                <a:latin typeface="Times New Roman"/>
-              </a:rPr>
-              <a:t>&lt;number&gt;</a:t>
-            </a:fld>
-            <a:endParaRPr b="0" lang="en-US" sz="1400" strike="noStrike" u="none">
-              <a:solidFill>
-                <a:srgbClr val="000000"/>
-              </a:solidFill>
-              <a:uFillTx/>
-              <a:latin typeface="Times New Roman"/>
-            </a:endParaRPr>
-          </a:p>
-        </p:txBody>
-      </p:sp>
     </p:spTree>
   </p:cSld>
   <p:clrMap bg1="lt1" tx1="dk1" bg2="lt2" tx2="dk2" accent1="accent1" accent2="accent2" accent3="accent3" accent4="accent4" accent5="accent5" accent6="accent6" hlink="hlink" folHlink="folHlink"/>
   <p:sldLayoutIdLst>
-    <p:sldLayoutId id="2147483649" r:id="rId2"/>
-    <p:sldLayoutId id="2147483650" r:id="rId3"/>
+    <p:sldLayoutId id="2147483651" r:id="rId2"/>
+    <p:sldLayoutId id="2147483652" r:id="rId3"/>
   </p:sldLayoutIdLst>
 </p:sldMaster>
 </file>
@@ -875,7 +1595,7 @@
       </p:grpSpPr>
       <p:pic>
         <p:nvPicPr>
-          <p:cNvPr id="9" name="" descr=""/>
+          <p:cNvPr id="16" name="" descr=""/>
           <p:cNvPicPr/>
           <p:nvPr/>
         </p:nvPicPr>
@@ -886,7 +1606,7 @@
         <p:spPr>
           <a:xfrm>
             <a:off x="585000" y="164880"/>
-            <a:ext cx="8973360" cy="5372280"/>
+            <a:ext cx="8973000" cy="5371920"/>
           </a:xfrm>
           <a:prstGeom prst="rect">
             <a:avLst/>
@@ -929,7 +1649,7 @@
       </p:grpSpPr>
       <p:sp>
         <p:nvSpPr>
-          <p:cNvPr id="10" name="PlaceHolder 1"/>
+          <p:cNvPr id="17" name="PlaceHolder 1"/>
           <p:cNvSpPr>
             <a:spLocks noGrp="1"/>
           </p:cNvSpPr>
@@ -940,7 +1660,7 @@
         <p:spPr>
           <a:xfrm>
             <a:off x="504000" y="226080"/>
-            <a:ext cx="9071640" cy="946440"/>
+            <a:ext cx="9071280" cy="946080"/>
           </a:xfrm>
           <a:prstGeom prst="rect">
             <a:avLst/>
@@ -958,19 +1678,19 @@
             <a:pPr indent="0" algn="ctr">
               <a:buNone/>
             </a:pPr>
-            <a:endParaRPr b="0" lang="en-US" sz="4400" strike="noStrike" u="none">
-              <a:solidFill>
-                <a:srgbClr val="000000"/>
-              </a:solidFill>
-              <a:uFillTx/>
-              <a:latin typeface="Arial"/>
-            </a:endParaRPr>
-          </a:p>
-        </p:txBody>
-      </p:sp>
-      <p:sp>
-        <p:nvSpPr>
-          <p:cNvPr id="11" name="PlaceHolder 2"/>
+            <a:endParaRPr b="0" lang="en-US" sz="1800" strike="noStrike" u="none">
+              <a:solidFill>
+                <a:srgbClr val="000000"/>
+              </a:solidFill>
+              <a:uFillTx/>
+              <a:latin typeface="Arial"/>
+            </a:endParaRPr>
+          </a:p>
+        </p:txBody>
+      </p:sp>
+      <p:sp>
+        <p:nvSpPr>
+          <p:cNvPr id="18" name="PlaceHolder 2"/>
           <p:cNvSpPr>
             <a:spLocks noGrp="1"/>
           </p:cNvSpPr>
@@ -981,7 +1701,7 @@
         <p:spPr>
           <a:xfrm>
             <a:off x="504000" y="1326600"/>
-            <a:ext cx="9071640" cy="3288240"/>
+            <a:ext cx="9071280" cy="3287880"/>
           </a:xfrm>
           <a:prstGeom prst="rect">
             <a:avLst/>
@@ -1002,7 +1722,7 @@
               </a:spcBef>
               <a:buNone/>
             </a:pPr>
-            <a:endParaRPr b="0" lang="en-US" sz="3200" strike="noStrike" u="none">
+            <a:endParaRPr b="0" lang="en-US" sz="1800" strike="noStrike" u="none">
               <a:solidFill>
                 <a:srgbClr val="000000"/>
               </a:solidFill>
@@ -1014,7 +1734,7 @@
       </p:sp>
       <p:pic>
         <p:nvPicPr>
-          <p:cNvPr id="12" name="" descr=""/>
+          <p:cNvPr id="19" name="" descr=""/>
           <p:cNvPicPr/>
           <p:nvPr/>
         </p:nvPicPr>
@@ -1025,7 +1745,7 @@
         <p:spPr>
           <a:xfrm>
             <a:off x="31680" y="102240"/>
-            <a:ext cx="10079640" cy="5497560"/>
+            <a:ext cx="10079280" cy="5497200"/>
           </a:xfrm>
           <a:prstGeom prst="rect">
             <a:avLst/>
@@ -1068,7 +1788,7 @@
       </p:grpSpPr>
       <p:sp>
         <p:nvSpPr>
-          <p:cNvPr id="13" name="PlaceHolder 1"/>
+          <p:cNvPr id="20" name="PlaceHolder 1"/>
           <p:cNvSpPr>
             <a:spLocks noGrp="1"/>
           </p:cNvSpPr>
@@ -1079,7 +1799,7 @@
         <p:spPr>
           <a:xfrm>
             <a:off x="504000" y="226080"/>
-            <a:ext cx="9071640" cy="946440"/>
+            <a:ext cx="9071280" cy="946080"/>
           </a:xfrm>
           <a:prstGeom prst="rect">
             <a:avLst/>
@@ -1097,19 +1817,19 @@
             <a:pPr indent="0" algn="ctr">
               <a:buNone/>
             </a:pPr>
-            <a:endParaRPr b="0" lang="en-US" sz="4400" strike="noStrike" u="none">
-              <a:solidFill>
-                <a:srgbClr val="000000"/>
-              </a:solidFill>
-              <a:uFillTx/>
-              <a:latin typeface="Arial"/>
-            </a:endParaRPr>
-          </a:p>
-        </p:txBody>
-      </p:sp>
-      <p:sp>
-        <p:nvSpPr>
-          <p:cNvPr id="14" name="PlaceHolder 2"/>
+            <a:endParaRPr b="0" lang="en-US" sz="1800" strike="noStrike" u="none">
+              <a:solidFill>
+                <a:srgbClr val="000000"/>
+              </a:solidFill>
+              <a:uFillTx/>
+              <a:latin typeface="Arial"/>
+            </a:endParaRPr>
+          </a:p>
+        </p:txBody>
+      </p:sp>
+      <p:sp>
+        <p:nvSpPr>
+          <p:cNvPr id="21" name="PlaceHolder 2"/>
           <p:cNvSpPr>
             <a:spLocks noGrp="1"/>
           </p:cNvSpPr>
@@ -1120,7 +1840,7 @@
         <p:spPr>
           <a:xfrm>
             <a:off x="504000" y="1326600"/>
-            <a:ext cx="9071640" cy="3288240"/>
+            <a:ext cx="9071280" cy="3287880"/>
           </a:xfrm>
           <a:prstGeom prst="rect">
             <a:avLst/>
@@ -1141,7 +1861,7 @@
               </a:spcBef>
               <a:buNone/>
             </a:pPr>
-            <a:endParaRPr b="0" lang="en-US" sz="3200" strike="noStrike" u="none">
+            <a:endParaRPr b="0" lang="en-US" sz="1800" strike="noStrike" u="none">
               <a:solidFill>
                 <a:srgbClr val="000000"/>
               </a:solidFill>
@@ -1153,7 +1873,7 @@
       </p:sp>
       <p:pic>
         <p:nvPicPr>
-          <p:cNvPr id="15" name="" descr=""/>
+          <p:cNvPr id="22" name="" descr=""/>
           <p:cNvPicPr/>
           <p:nvPr/>
         </p:nvPicPr>
@@ -1164,7 +1884,7 @@
         <p:spPr>
           <a:xfrm>
             <a:off x="237240" y="1455840"/>
-            <a:ext cx="9668520" cy="2790720"/>
+            <a:ext cx="9668160" cy="2790360"/>
           </a:xfrm>
           <a:prstGeom prst="rect">
             <a:avLst/>
@@ -1207,7 +1927,7 @@
       </p:grpSpPr>
       <p:sp>
         <p:nvSpPr>
-          <p:cNvPr id="16" name="PlaceHolder 1"/>
+          <p:cNvPr id="23" name="PlaceHolder 1"/>
           <p:cNvSpPr>
             <a:spLocks noGrp="1"/>
           </p:cNvSpPr>
@@ -1218,7 +1938,7 @@
         <p:spPr>
           <a:xfrm>
             <a:off x="504000" y="226080"/>
-            <a:ext cx="9071640" cy="946440"/>
+            <a:ext cx="9071280" cy="946080"/>
           </a:xfrm>
           <a:prstGeom prst="rect">
             <a:avLst/>
@@ -1236,19 +1956,19 @@
             <a:pPr indent="0" algn="ctr">
               <a:buNone/>
             </a:pPr>
-            <a:endParaRPr b="0" lang="en-US" sz="4400" strike="noStrike" u="none">
-              <a:solidFill>
-                <a:srgbClr val="000000"/>
-              </a:solidFill>
-              <a:uFillTx/>
-              <a:latin typeface="Arial"/>
-            </a:endParaRPr>
-          </a:p>
-        </p:txBody>
-      </p:sp>
-      <p:sp>
-        <p:nvSpPr>
-          <p:cNvPr id="17" name="PlaceHolder 2"/>
+            <a:endParaRPr b="0" lang="en-US" sz="1800" strike="noStrike" u="none">
+              <a:solidFill>
+                <a:srgbClr val="000000"/>
+              </a:solidFill>
+              <a:uFillTx/>
+              <a:latin typeface="Arial"/>
+            </a:endParaRPr>
+          </a:p>
+        </p:txBody>
+      </p:sp>
+      <p:sp>
+        <p:nvSpPr>
+          <p:cNvPr id="24" name="PlaceHolder 2"/>
           <p:cNvSpPr>
             <a:spLocks noGrp="1"/>
           </p:cNvSpPr>
@@ -1259,7 +1979,7 @@
         <p:spPr>
           <a:xfrm>
             <a:off x="504000" y="1326600"/>
-            <a:ext cx="9071640" cy="3288240"/>
+            <a:ext cx="9071280" cy="3287880"/>
           </a:xfrm>
           <a:prstGeom prst="rect">
             <a:avLst/>
@@ -1280,7 +2000,7 @@
               </a:spcBef>
               <a:buNone/>
             </a:pPr>
-            <a:endParaRPr b="0" lang="en-US" sz="3200" strike="noStrike" u="none">
+            <a:endParaRPr b="0" lang="en-US" sz="1800" strike="noStrike" u="none">
               <a:solidFill>
                 <a:srgbClr val="000000"/>
               </a:solidFill>
@@ -1292,7 +2012,7 @@
       </p:sp>
       <p:pic>
         <p:nvPicPr>
-          <p:cNvPr id="18" name="" descr=""/>
+          <p:cNvPr id="25" name="" descr=""/>
           <p:cNvPicPr/>
           <p:nvPr/>
         </p:nvPicPr>
@@ -1303,7 +2023,7 @@
         <p:spPr>
           <a:xfrm>
             <a:off x="189720" y="412560"/>
-            <a:ext cx="9763920" cy="4876920"/>
+            <a:ext cx="9763560" cy="4876560"/>
           </a:xfrm>
           <a:prstGeom prst="rect">
             <a:avLst/>
@@ -1346,7 +2066,7 @@
       </p:grpSpPr>
       <p:sp>
         <p:nvSpPr>
-          <p:cNvPr id="19" name="PlaceHolder 1"/>
+          <p:cNvPr id="26" name="PlaceHolder 1"/>
           <p:cNvSpPr>
             <a:spLocks noGrp="1"/>
           </p:cNvSpPr>
@@ -1357,7 +2077,7 @@
         <p:spPr>
           <a:xfrm>
             <a:off x="504000" y="226080"/>
-            <a:ext cx="9071640" cy="946440"/>
+            <a:ext cx="9071280" cy="946080"/>
           </a:xfrm>
           <a:prstGeom prst="rect">
             <a:avLst/>
@@ -1375,19 +2095,19 @@
             <a:pPr indent="0" algn="ctr">
               <a:buNone/>
             </a:pPr>
-            <a:endParaRPr b="0" lang="en-US" sz="4400" strike="noStrike" u="none">
-              <a:solidFill>
-                <a:srgbClr val="000000"/>
-              </a:solidFill>
-              <a:uFillTx/>
-              <a:latin typeface="Arial"/>
-            </a:endParaRPr>
-          </a:p>
-        </p:txBody>
-      </p:sp>
-      <p:sp>
-        <p:nvSpPr>
-          <p:cNvPr id="20" name="PlaceHolder 2"/>
+            <a:endParaRPr b="0" lang="en-US" sz="1800" strike="noStrike" u="none">
+              <a:solidFill>
+                <a:srgbClr val="000000"/>
+              </a:solidFill>
+              <a:uFillTx/>
+              <a:latin typeface="Arial"/>
+            </a:endParaRPr>
+          </a:p>
+        </p:txBody>
+      </p:sp>
+      <p:sp>
+        <p:nvSpPr>
+          <p:cNvPr id="27" name="PlaceHolder 2"/>
           <p:cNvSpPr>
             <a:spLocks noGrp="1"/>
           </p:cNvSpPr>
@@ -1398,7 +2118,7 @@
         <p:spPr>
           <a:xfrm>
             <a:off x="504000" y="1326600"/>
-            <a:ext cx="9071640" cy="3288240"/>
+            <a:ext cx="9071280" cy="3287880"/>
           </a:xfrm>
           <a:prstGeom prst="rect">
             <a:avLst/>
@@ -1419,7 +2139,7 @@
               </a:spcBef>
               <a:buNone/>
             </a:pPr>
-            <a:endParaRPr b="0" lang="en-US" sz="3200" strike="noStrike" u="none">
+            <a:endParaRPr b="0" lang="en-US" sz="1800" strike="noStrike" u="none">
               <a:solidFill>
                 <a:srgbClr val="000000"/>
               </a:solidFill>
@@ -1431,7 +2151,7 @@
       </p:sp>
       <p:pic>
         <p:nvPicPr>
-          <p:cNvPr id="21" name="" descr=""/>
+          <p:cNvPr id="28" name="" descr=""/>
           <p:cNvPicPr/>
           <p:nvPr/>
         </p:nvPicPr>
@@ -1442,7 +2162,7 @@
         <p:spPr>
           <a:xfrm>
             <a:off x="275400" y="569880"/>
-            <a:ext cx="9592560" cy="4562640"/>
+            <a:ext cx="9592200" cy="4562280"/>
           </a:xfrm>
           <a:prstGeom prst="rect">
             <a:avLst/>
@@ -1485,7 +2205,7 @@
       </p:grpSpPr>
       <p:sp>
         <p:nvSpPr>
-          <p:cNvPr id="22" name="PlaceHolder 1"/>
+          <p:cNvPr id="29" name="PlaceHolder 1"/>
           <p:cNvSpPr>
             <a:spLocks noGrp="1"/>
           </p:cNvSpPr>
@@ -1496,7 +2216,7 @@
         <p:spPr>
           <a:xfrm>
             <a:off x="504000" y="226080"/>
-            <a:ext cx="9071640" cy="946440"/>
+            <a:ext cx="9071280" cy="946080"/>
           </a:xfrm>
           <a:prstGeom prst="rect">
             <a:avLst/>
@@ -1514,19 +2234,19 @@
             <a:pPr indent="0" algn="ctr">
               <a:buNone/>
             </a:pPr>
-            <a:endParaRPr b="0" lang="en-US" sz="4400" strike="noStrike" u="none">
-              <a:solidFill>
-                <a:srgbClr val="000000"/>
-              </a:solidFill>
-              <a:uFillTx/>
-              <a:latin typeface="Arial"/>
-            </a:endParaRPr>
-          </a:p>
-        </p:txBody>
-      </p:sp>
-      <p:sp>
-        <p:nvSpPr>
-          <p:cNvPr id="23" name="PlaceHolder 2"/>
+            <a:endParaRPr b="0" lang="en-US" sz="1800" strike="noStrike" u="none">
+              <a:solidFill>
+                <a:srgbClr val="000000"/>
+              </a:solidFill>
+              <a:uFillTx/>
+              <a:latin typeface="Arial"/>
+            </a:endParaRPr>
+          </a:p>
+        </p:txBody>
+      </p:sp>
+      <p:sp>
+        <p:nvSpPr>
+          <p:cNvPr id="30" name="PlaceHolder 2"/>
           <p:cNvSpPr>
             <a:spLocks noGrp="1"/>
           </p:cNvSpPr>
@@ -1537,7 +2257,7 @@
         <p:spPr>
           <a:xfrm>
             <a:off x="504000" y="1326600"/>
-            <a:ext cx="9071640" cy="3288240"/>
+            <a:ext cx="9071280" cy="3287880"/>
           </a:xfrm>
           <a:prstGeom prst="rect">
             <a:avLst/>
@@ -1558,7 +2278,7 @@
               </a:spcBef>
               <a:buNone/>
             </a:pPr>
-            <a:endParaRPr b="0" lang="en-US" sz="3200" strike="noStrike" u="none">
+            <a:endParaRPr b="0" lang="en-US" sz="1800" strike="noStrike" u="none">
               <a:solidFill>
                 <a:srgbClr val="000000"/>
               </a:solidFill>
@@ -1570,7 +2290,7 @@
       </p:sp>
       <p:pic>
         <p:nvPicPr>
-          <p:cNvPr id="24" name="" descr=""/>
+          <p:cNvPr id="31" name="" descr=""/>
           <p:cNvPicPr/>
           <p:nvPr/>
         </p:nvPicPr>
@@ -1581,7 +2301,146 @@
         <p:spPr>
           <a:xfrm>
             <a:off x="1251720" y="1317600"/>
-            <a:ext cx="7639560" cy="3066840"/>
+            <a:ext cx="7639200" cy="3066480"/>
+          </a:xfrm>
+          <a:prstGeom prst="rect">
+            <a:avLst/>
+          </a:prstGeom>
+          <a:noFill/>
+          <a:ln w="0">
+            <a:noFill/>
+          </a:ln>
+        </p:spPr>
+      </p:pic>
+    </p:spTree>
+  </p:cSld>
+  <mc:AlternateContent>
+    <mc:Choice Requires="p14">
+      <p:transition spd="slow" p14:dur="2000"/>
+    </mc:Choice>
+    <mc:Fallback>
+      <p:transition spd="slow"/>
+    </mc:Fallback>
+  </mc:AlternateContent>
+</p:sld>
+</file>
+
+<file path=ppt/slides/slide7.xml><?xml version="1.0" encoding="utf-8"?>
+<p:sld xmlns:a="http://schemas.openxmlformats.org/drawingml/2006/main" xmlns:p="http://schemas.openxmlformats.org/presentationml/2006/main" xmlns:r="http://schemas.openxmlformats.org/officeDocument/2006/relationships" xmlns:p14="http://schemas.microsoft.com/office/powerpoint/2010/main" xmlns:p15="http://schemas.microsoft.com/office/powerpoint/2012/main" xmlns:mc="http://schemas.openxmlformats.org/markup-compatibility/2006">
+  <p:cSld>
+    <p:spTree>
+      <p:nvGrpSpPr>
+        <p:cNvPr id="1" name=""/>
+        <p:cNvGrpSpPr/>
+        <p:nvPr/>
+      </p:nvGrpSpPr>
+      <p:grpSpPr>
+        <a:xfrm>
+          <a:off x="0" y="0"/>
+          <a:ext cx="0" cy="0"/>
+          <a:chOff x="0" y="0"/>
+          <a:chExt cx="0" cy="0"/>
+        </a:xfrm>
+      </p:grpSpPr>
+      <p:sp>
+        <p:nvSpPr>
+          <p:cNvPr id="32" name="PlaceHolder 1"/>
+          <p:cNvSpPr>
+            <a:spLocks noGrp="1"/>
+          </p:cNvSpPr>
+          <p:nvPr>
+            <p:ph type="title"/>
+          </p:nvPr>
+        </p:nvSpPr>
+        <p:spPr>
+          <a:xfrm>
+            <a:off x="504000" y="226080"/>
+            <a:ext cx="9071280" cy="946080"/>
+          </a:xfrm>
+          <a:prstGeom prst="rect">
+            <a:avLst/>
+          </a:prstGeom>
+          <a:noFill/>
+          <a:ln w="0">
+            <a:noFill/>
+          </a:ln>
+        </p:spPr>
+        <p:txBody>
+          <a:bodyPr lIns="0" rIns="0" tIns="0" bIns="0" anchor="ctr">
+            <a:noAutofit/>
+          </a:bodyPr>
+          <a:p>
+            <a:pPr indent="0" algn="ctr">
+              <a:buNone/>
+            </a:pPr>
+            <a:endParaRPr b="0" lang="en-US" sz="4400" strike="noStrike" u="none">
+              <a:solidFill>
+                <a:srgbClr val="000000"/>
+              </a:solidFill>
+              <a:uFillTx/>
+              <a:latin typeface="Arial"/>
+            </a:endParaRPr>
+          </a:p>
+        </p:txBody>
+      </p:sp>
+      <p:sp>
+        <p:nvSpPr>
+          <p:cNvPr id="33" name="PlaceHolder 2"/>
+          <p:cNvSpPr>
+            <a:spLocks noGrp="1"/>
+          </p:cNvSpPr>
+          <p:nvPr>
+            <p:ph/>
+          </p:nvPr>
+        </p:nvSpPr>
+        <p:spPr>
+          <a:xfrm>
+            <a:off x="504000" y="1326600"/>
+            <a:ext cx="9071280" cy="3287880"/>
+          </a:xfrm>
+          <a:prstGeom prst="rect">
+            <a:avLst/>
+          </a:prstGeom>
+          <a:noFill/>
+          <a:ln w="0">
+            <a:noFill/>
+          </a:ln>
+        </p:spPr>
+        <p:txBody>
+          <a:bodyPr lIns="0" rIns="0" tIns="0" bIns="0" anchor="t">
+            <a:normAutofit/>
+          </a:bodyPr>
+          <a:p>
+            <a:pPr indent="0">
+              <a:spcBef>
+                <a:spcPts val="1417"/>
+              </a:spcBef>
+              <a:buNone/>
+            </a:pPr>
+            <a:endParaRPr b="0" lang="en-US" sz="3200" strike="noStrike" u="none">
+              <a:solidFill>
+                <a:srgbClr val="000000"/>
+              </a:solidFill>
+              <a:uFillTx/>
+              <a:latin typeface="Arial"/>
+            </a:endParaRPr>
+          </a:p>
+        </p:txBody>
+      </p:sp>
+      <p:pic>
+        <p:nvPicPr>
+          <p:cNvPr id="34" name="" descr=""/>
+          <p:cNvPicPr/>
+          <p:nvPr/>
+        </p:nvPicPr>
+        <p:blipFill>
+          <a:blip r:embed="rId1"/>
+          <a:stretch/>
+        </p:blipFill>
+        <p:spPr>
+          <a:xfrm>
+            <a:off x="31320" y="1213920"/>
+            <a:ext cx="10080360" cy="3274200"/>
           </a:xfrm>
           <a:prstGeom prst="rect">
             <a:avLst/>
@@ -1709,4 +2568,110 @@
     </a:fmtScheme>
   </a:themeElements>
 </a:theme>
+</file>
+
+<file path=ppt/theme/theme2.xml><?xml version="1.0" encoding="utf-8"?>
+<a:theme xmlns:a="http://schemas.openxmlformats.org/drawingml/2006/main" xmlns:r="http://schemas.openxmlformats.org/officeDocument/2006/relationships" name="Office">
+  <a:themeElements>
+    <a:clrScheme name="LibreOffice">
+      <a:dk1>
+        <a:srgbClr val="000000"/>
+      </a:dk1>
+      <a:lt1>
+        <a:srgbClr val="ffffff"/>
+      </a:lt1>
+      <a:dk2>
+        <a:srgbClr val="000000"/>
+      </a:dk2>
+      <a:lt2>
+        <a:srgbClr val="ffffff"/>
+      </a:lt2>
+      <a:accent1>
+        <a:srgbClr val="18a303"/>
+      </a:accent1>
+      <a:accent2>
+        <a:srgbClr val="0369a3"/>
+      </a:accent2>
+      <a:accent3>
+        <a:srgbClr val="a33e03"/>
+      </a:accent3>
+      <a:accent4>
+        <a:srgbClr val="8e03a3"/>
+      </a:accent4>
+      <a:accent5>
+        <a:srgbClr val="c99c00"/>
+      </a:accent5>
+      <a:accent6>
+        <a:srgbClr val="c9211e"/>
+      </a:accent6>
+      <a:hlink>
+        <a:srgbClr val="0000ee"/>
+      </a:hlink>
+      <a:folHlink>
+        <a:srgbClr val="551a8b"/>
+      </a:folHlink>
+    </a:clrScheme>
+    <a:fontScheme name="Office">
+      <a:majorFont>
+        <a:latin typeface="Arial" pitchFamily="0" charset="1"/>
+        <a:ea typeface="DejaVu Sans" pitchFamily="0" charset="1"/>
+        <a:cs typeface="DejaVu Sans" pitchFamily="0" charset="1"/>
+      </a:majorFont>
+      <a:minorFont>
+        <a:latin typeface="Arial" pitchFamily="0" charset="1"/>
+        <a:ea typeface="DejaVu Sans" pitchFamily="0" charset="1"/>
+        <a:cs typeface="DejaVu Sans" pitchFamily="0" charset="1"/>
+      </a:minorFont>
+    </a:fontScheme>
+    <a:fmtScheme>
+      <a:fillStyleLst>
+        <a:solidFill>
+          <a:schemeClr val="phClr"/>
+        </a:solidFill>
+        <a:solidFill>
+          <a:schemeClr val="phClr"/>
+        </a:solidFill>
+        <a:solidFill>
+          <a:schemeClr val="phClr"/>
+        </a:solidFill>
+      </a:fillStyleLst>
+      <a:lnStyleLst>
+        <a:ln w="6350" cap="flat" cmpd="sng" algn="ctr">
+          <a:prstDash val="solid"/>
+          <a:miter/>
+        </a:ln>
+        <a:ln w="6350" cap="flat" cmpd="sng" algn="ctr">
+          <a:prstDash val="solid"/>
+          <a:miter/>
+        </a:ln>
+        <a:ln w="6350" cap="flat" cmpd="sng" algn="ctr">
+          <a:prstDash val="solid"/>
+          <a:miter/>
+        </a:ln>
+      </a:lnStyleLst>
+      <a:effectStyleLst>
+        <a:effectStyle>
+          <a:effectLst/>
+        </a:effectStyle>
+        <a:effectStyle>
+          <a:effectLst/>
+        </a:effectStyle>
+        <a:effectStyle>
+          <a:effectLst/>
+        </a:effectStyle>
+      </a:effectStyleLst>
+      <a:bgFillStyleLst>
+        <a:solidFill>
+          <a:schemeClr val="phClr"/>
+        </a:solidFill>
+        <a:solidFill>
+          <a:schemeClr val="phClr"/>
+        </a:solidFill>
+        <a:solidFill>
+          <a:schemeClr val="phClr"/>
+        </a:solidFill>
+      </a:bgFillStyleLst>
+    </a:fmtScheme>
+  </a:themeElements>
+</a:theme>
 </file>
</xml_diff>